<commit_message>
Folien in Kapitel 1 angepasst
Neuer Foliensatz zu DIKW aus SIM DMAR
</commit_message>
<xml_diff>
--- a/Steuerlehre (B.A.) - Datenmanagement (dt)/folien/LE 1 - Einführung Datenmanagement STL/00 Ueberblick.pptx
+++ b/Steuerlehre (B.A.) - Datenmanagement (dt)/folien/LE 1 - Einführung Datenmanagement STL/00 Ueberblick.pptx
@@ -259,6 +259,30 @@
       </pc:sldChg>
     </pc:docChg>
   </pc:docChgLst>
+  <pc:docChgLst>
+    <pc:chgData name="Markus Grüne" userId="079e2bdfe6328f32" providerId="LiveId" clId="{A83C2983-3577-4330-8393-7D604F2CE1E4}"/>
+    <pc:docChg chg="modSld">
+      <pc:chgData name="Markus Grüne" userId="079e2bdfe6328f32" providerId="LiveId" clId="{A83C2983-3577-4330-8393-7D604F2CE1E4}" dt="2025-04-15T07:56:39.305" v="1" actId="20577"/>
+      <pc:docMkLst>
+        <pc:docMk/>
+      </pc:docMkLst>
+      <pc:sldChg chg="modSp mod">
+        <pc:chgData name="Markus Grüne" userId="079e2bdfe6328f32" providerId="LiveId" clId="{A83C2983-3577-4330-8393-7D604F2CE1E4}" dt="2025-04-15T07:56:39.305" v="1" actId="20577"/>
+        <pc:sldMkLst>
+          <pc:docMk/>
+          <pc:sldMk cId="2760281435" sldId="256"/>
+        </pc:sldMkLst>
+        <pc:spChg chg="mod">
+          <ac:chgData name="Markus Grüne" userId="079e2bdfe6328f32" providerId="LiveId" clId="{A83C2983-3577-4330-8393-7D604F2CE1E4}" dt="2025-04-15T07:56:39.305" v="1" actId="20577"/>
+          <ac:spMkLst>
+            <pc:docMk/>
+            <pc:sldMk cId="2760281435" sldId="256"/>
+            <ac:spMk id="7" creationId="{E5768AA4-227E-4EBA-8785-FDC13202D176}"/>
+          </ac:spMkLst>
+        </pc:spChg>
+      </pc:sldChg>
+    </pc:docChg>
+  </pc:docChgLst>
 </pc:chgInfo>
 </file>
 
@@ -344,7 +368,7 @@
           <a:p>
             <a:fld id="{6DDABE12-7F56-5040-9EA0-350342ABED27}" type="datetimeFigureOut">
               <a:rPr lang="de-DE" smtClean="0"/>
-              <a:t>01.04.2025</a:t>
+              <a:t>15.04.2025</a:t>
             </a:fld>
             <a:endParaRPr lang="de-DE"/>
           </a:p>
@@ -2017,7 +2041,7 @@
           <a:p>
             <a:fld id="{6335777B-E35E-47C8-949E-CE608A31BDAE}" type="datetime1">
               <a:rPr lang="de-DE" smtClean="0"/>
-              <a:t>01.04.2025</a:t>
+              <a:t>15.04.2025</a:t>
             </a:fld>
             <a:endParaRPr lang="de-DE" dirty="0"/>
           </a:p>
@@ -2535,7 +2559,7 @@
           <a:p>
             <a:fld id="{C5723318-BD6F-4197-ABA4-26F7493EFFE3}" type="datetime1">
               <a:rPr lang="de-DE" smtClean="0"/>
-              <a:t>01.04.2025</a:t>
+              <a:t>15.04.2025</a:t>
             </a:fld>
             <a:endParaRPr lang="de-DE" dirty="0"/>
           </a:p>
@@ -3054,7 +3078,7 @@
           <a:p>
             <a:fld id="{37A86BAA-E645-4F9C-BC32-AEFBCED23B4E}" type="datetime1">
               <a:rPr lang="de-DE" smtClean="0"/>
-              <a:t>01.04.2025</a:t>
+              <a:t>15.04.2025</a:t>
             </a:fld>
             <a:endParaRPr lang="de-DE" dirty="0"/>
           </a:p>
@@ -3409,7 +3433,7 @@
           <a:p>
             <a:fld id="{5727C9DD-B81F-4352-A86E-86156EF848FA}" type="datetime1">
               <a:rPr lang="de-DE" smtClean="0"/>
-              <a:t>01.04.2025</a:t>
+              <a:t>15.04.2025</a:t>
             </a:fld>
             <a:endParaRPr lang="de-DE" dirty="0"/>
           </a:p>
@@ -3857,7 +3881,7 @@
           <a:p>
             <a:fld id="{A65FBB95-6289-44C6-AC46-F91C4B2DE839}" type="datetime1">
               <a:rPr lang="de-DE" smtClean="0"/>
-              <a:t>01.04.2025</a:t>
+              <a:t>15.04.2025</a:t>
             </a:fld>
             <a:endParaRPr lang="de-DE" dirty="0"/>
           </a:p>
@@ -4306,7 +4330,7 @@
           <a:p>
             <a:fld id="{B5E76531-6678-482C-9C24-CA927D985E4A}" type="datetime1">
               <a:rPr lang="de-DE" smtClean="0"/>
-              <a:t>01.04.2025</a:t>
+              <a:t>15.04.2025</a:t>
             </a:fld>
             <a:endParaRPr lang="de-DE" dirty="0"/>
           </a:p>
@@ -4777,7 +4801,7 @@
           <a:p>
             <a:fld id="{BA5228FE-AB61-469A-8783-84DE522FD9FC}" type="datetime1">
               <a:rPr lang="de-DE" smtClean="0"/>
-              <a:t>01.04.2025</a:t>
+              <a:t>15.04.2025</a:t>
             </a:fld>
             <a:endParaRPr lang="de-DE" dirty="0"/>
           </a:p>
@@ -5391,7 +5415,7 @@
           <a:p>
             <a:fld id="{9CD77EA5-820A-46EF-8B17-3058284D76B4}" type="datetime1">
               <a:rPr lang="de-DE" smtClean="0"/>
-              <a:t>01.04.2025</a:t>
+              <a:t>15.04.2025</a:t>
             </a:fld>
             <a:endParaRPr lang="de-DE" dirty="0"/>
           </a:p>
@@ -6054,7 +6078,7 @@
           <a:p>
             <a:fld id="{187E199C-57FA-46D2-8E6D-446E8375C2C2}" type="datetime1">
               <a:rPr lang="de-DE" smtClean="0"/>
-              <a:t>01.04.2025</a:t>
+              <a:t>15.04.2025</a:t>
             </a:fld>
             <a:endParaRPr lang="de-DE" dirty="0"/>
           </a:p>
@@ -7430,7 +7454,7 @@
           <a:p>
             <a:fld id="{C0059374-B03B-4F19-B5D8-B96B279395D7}" type="datetime1">
               <a:rPr lang="de-DE" smtClean="0"/>
-              <a:t>01.04.2025</a:t>
+              <a:t>15.04.2025</a:t>
             </a:fld>
             <a:endParaRPr lang="de-DE" dirty="0"/>
           </a:p>
@@ -7792,7 +7816,7 @@
           <a:p>
             <a:fld id="{2DA7FB28-22DD-4E87-9821-B33C9C7F0B24}" type="datetime1">
               <a:rPr lang="de-DE" smtClean="0"/>
-              <a:t>01.04.2025</a:t>
+              <a:t>15.04.2025</a:t>
             </a:fld>
             <a:endParaRPr lang="de-DE" dirty="0"/>
           </a:p>
@@ -8792,7 +8816,7 @@
           <a:p>
             <a:fld id="{2E51D878-D4AF-4C6C-8D69-223EAA59AAAB}" type="datetime1">
               <a:rPr lang="de-DE" smtClean="0"/>
-              <a:t>01.04.2025</a:t>
+              <a:t>15.04.2025</a:t>
             </a:fld>
             <a:endParaRPr lang="de-DE" dirty="0"/>
           </a:p>
@@ -9779,7 +9803,7 @@
           <a:p>
             <a:fld id="{18B1DA32-EE04-41F0-BB68-06FF86428EFE}" type="datetime1">
               <a:rPr lang="de-DE" smtClean="0"/>
-              <a:t>01.04.2025</a:t>
+              <a:t>15.04.2025</a:t>
             </a:fld>
             <a:endParaRPr lang="de-DE" dirty="0"/>
           </a:p>
@@ -10499,7 +10523,7 @@
           <a:p>
             <a:fld id="{0BE2886B-8158-4AB5-B8F6-94435C713231}" type="datetime1">
               <a:rPr lang="de-DE" smtClean="0"/>
-              <a:t>01.04.2025</a:t>
+              <a:t>15.04.2025</a:t>
             </a:fld>
             <a:endParaRPr lang="de-DE" dirty="0"/>
           </a:p>
@@ -11461,7 +11485,7 @@
           <a:p>
             <a:fld id="{CCBCEC11-6BB9-4644-842D-0DE43B13EF35}" type="datetime1">
               <a:rPr lang="de-DE" smtClean="0"/>
-              <a:t>01.04.2025</a:t>
+              <a:t>15.04.2025</a:t>
             </a:fld>
             <a:endParaRPr lang="de-DE" dirty="0"/>
           </a:p>
@@ -12076,7 +12100,7 @@
           <a:p>
             <a:fld id="{88478446-27C4-4403-AA12-6A98C9596A98}" type="datetime1">
               <a:rPr lang="de-DE" smtClean="0"/>
-              <a:t>01.04.2025</a:t>
+              <a:t>15.04.2025</a:t>
             </a:fld>
             <a:endParaRPr lang="de-DE" dirty="0"/>
           </a:p>
@@ -12515,7 +12539,7 @@
           <a:p>
             <a:fld id="{B88FAF63-B4FD-47F6-A377-EBE562FBA989}" type="datetime1">
               <a:rPr lang="de-DE" smtClean="0"/>
-              <a:t>01.04.2025</a:t>
+              <a:t>15.04.2025</a:t>
             </a:fld>
             <a:endParaRPr lang="de-DE" dirty="0"/>
           </a:p>
@@ -13123,7 +13147,7 @@
           <a:p>
             <a:fld id="{0878D2D4-06E0-4BC4-A499-8357934A5226}" type="datetime1">
               <a:rPr lang="de-DE" smtClean="0"/>
-              <a:t>01.04.2025</a:t>
+              <a:t>15.04.2025</a:t>
             </a:fld>
             <a:endParaRPr lang="de-DE" dirty="0"/>
           </a:p>
@@ -14617,7 +14641,7 @@
           <a:p>
             <a:fld id="{17441728-9C75-48ED-ABF2-15609A4FC0D5}" type="datetime1">
               <a:rPr lang="de-DE" smtClean="0"/>
-              <a:t>01.04.2025</a:t>
+              <a:t>15.04.2025</a:t>
             </a:fld>
             <a:endParaRPr lang="de-DE" dirty="0"/>
           </a:p>
@@ -15925,7 +15949,7 @@
           <a:p>
             <a:fld id="{53BF0432-D8DF-4737-AF15-3B854651B9B0}" type="datetime1">
               <a:rPr lang="de-DE" smtClean="0"/>
-              <a:t>01.04.2025</a:t>
+              <a:t>15.04.2025</a:t>
             </a:fld>
             <a:endParaRPr lang="de-DE" dirty="0"/>
           </a:p>
@@ -16284,7 +16308,7 @@
           <a:p>
             <a:fld id="{6EBA444E-4DA3-41E0-8443-6AFD40F7E062}" type="datetime1">
               <a:rPr lang="de-DE" smtClean="0"/>
-              <a:t>01.04.2025</a:t>
+              <a:t>15.04.2025</a:t>
             </a:fld>
             <a:endParaRPr lang="de-DE" dirty="0"/>
           </a:p>
@@ -16502,7 +16526,7 @@
           <a:p>
             <a:fld id="{9EAB4986-381D-4F67-9029-123892E38BFB}" type="datetime1">
               <a:rPr lang="de-DE" smtClean="0"/>
-              <a:t>01.04.2025</a:t>
+              <a:t>15.04.2025</a:t>
             </a:fld>
             <a:endParaRPr lang="de-DE" dirty="0"/>
           </a:p>
@@ -16640,7 +16664,7 @@
           <a:p>
             <a:fld id="{8B1A9F23-F2AF-4835-B6DA-744B593F160D}" type="datetime1">
               <a:rPr lang="de-DE" smtClean="0"/>
-              <a:t>01.04.2025</a:t>
+              <a:t>15.04.2025</a:t>
             </a:fld>
             <a:endParaRPr lang="de-DE" dirty="0"/>
           </a:p>
@@ -17162,7 +17186,7 @@
             </a:br>
             <a:r>
               <a:rPr lang="de-DE"/>
-              <a:t>SoSe 2024 (STL)</a:t>
+              <a:t>SoSe 2025 (STL)</a:t>
             </a:r>
             <a:br>
               <a:rPr lang="de-DE"/>
@@ -18484,6 +18508,23 @@
 </file>
 
 <file path=customXml/item1.xml><?xml version="1.0" encoding="utf-8"?>
+<p:properties xmlns:p="http://schemas.microsoft.com/office/2006/metadata/properties" xmlns:xsi="http://www.w3.org/2001/XMLSchema-instance" xmlns:pc="http://schemas.microsoft.com/office/infopath/2007/PartnerControls">
+  <documentManagement>
+    <_activity xmlns="978c12c1-a4b5-48eb-9710-7e2c09831ca5" xsi:nil="true"/>
+  </documentManagement>
+</p:properties>
+</file>
+
+<file path=customXml/item2.xml><?xml version="1.0" encoding="utf-8"?>
+<?mso-contentType ?>
+<FormTemplates xmlns="http://schemas.microsoft.com/sharepoint/v3/contenttype/forms">
+  <Display>DocumentLibraryForm</Display>
+  <Edit>DocumentLibraryForm</Edit>
+  <New>DocumentLibraryForm</New>
+</FormTemplates>
+</file>
+
+<file path=customXml/item3.xml><?xml version="1.0" encoding="utf-8"?>
 <ct:contentTypeSchema xmlns:ct="http://schemas.microsoft.com/office/2006/metadata/contentType" xmlns:ma="http://schemas.microsoft.com/office/2006/metadata/properties/metaAttributes" ct:_="" ma:_="" ma:contentTypeName="Document" ma:contentTypeID="0x010100D18C91BC75D30346A7079A9D779989F9" ma:contentTypeVersion="12" ma:contentTypeDescription="Create a new document." ma:contentTypeScope="" ma:versionID="a7909cae55f147a568e8768c3ca8c908">
   <xsd:schema xmlns:xsd="http://www.w3.org/2001/XMLSchema" xmlns:xs="http://www.w3.org/2001/XMLSchema" xmlns:p="http://schemas.microsoft.com/office/2006/metadata/properties" xmlns:ns3="978c12c1-a4b5-48eb-9710-7e2c09831ca5" targetNamespace="http://schemas.microsoft.com/office/2006/metadata/properties" ma:root="true" ma:fieldsID="912194e9175701083edfc628c0f02cfc" ns3:_="">
     <xsd:import namespace="978c12c1-a4b5-48eb-9710-7e2c09831ca5"/>
@@ -18677,24 +18718,31 @@
 </ct:contentTypeSchema>
 </file>
 
-<file path=customXml/item2.xml><?xml version="1.0" encoding="utf-8"?>
-<?mso-contentType ?>
-<FormTemplates xmlns="http://schemas.microsoft.com/sharepoint/v3/contenttype/forms">
-  <Display>DocumentLibraryForm</Display>
-  <Edit>DocumentLibraryForm</Edit>
-  <New>DocumentLibraryForm</New>
-</FormTemplates>
+<file path=customXml/itemProps1.xml><?xml version="1.0" encoding="utf-8"?>
+<ds:datastoreItem xmlns:ds="http://schemas.openxmlformats.org/officeDocument/2006/customXml" ds:itemID="{1090C72B-3F12-47E7-B8FF-10DAB1B14D76}">
+  <ds:schemaRefs>
+    <ds:schemaRef ds:uri="http://purl.org/dc/terms/"/>
+    <ds:schemaRef ds:uri="http://www.w3.org/XML/1998/namespace"/>
+    <ds:schemaRef ds:uri="http://purl.org/dc/dcmitype/"/>
+    <ds:schemaRef ds:uri="978c12c1-a4b5-48eb-9710-7e2c09831ca5"/>
+    <ds:schemaRef ds:uri="http://schemas.microsoft.com/office/2006/documentManagement/types"/>
+    <ds:schemaRef ds:uri="http://schemas.openxmlformats.org/package/2006/metadata/core-properties"/>
+    <ds:schemaRef ds:uri="http://schemas.microsoft.com/office/infopath/2007/PartnerControls"/>
+    <ds:schemaRef ds:uri="http://schemas.microsoft.com/office/2006/metadata/properties"/>
+    <ds:schemaRef ds:uri="http://purl.org/dc/elements/1.1/"/>
+  </ds:schemaRefs>
+</ds:datastoreItem>
 </file>
 
-<file path=customXml/item3.xml><?xml version="1.0" encoding="utf-8"?>
-<p:properties xmlns:p="http://schemas.microsoft.com/office/2006/metadata/properties" xmlns:xsi="http://www.w3.org/2001/XMLSchema-instance" xmlns:pc="http://schemas.microsoft.com/office/infopath/2007/PartnerControls">
-  <documentManagement>
-    <_activity xmlns="978c12c1-a4b5-48eb-9710-7e2c09831ca5" xsi:nil="true"/>
-  </documentManagement>
-</p:properties>
+<file path=customXml/itemProps2.xml><?xml version="1.0" encoding="utf-8"?>
+<ds:datastoreItem xmlns:ds="http://schemas.openxmlformats.org/officeDocument/2006/customXml" ds:itemID="{A7B02A9D-9434-4C86-80C1-9F3F215070DB}">
+  <ds:schemaRefs>
+    <ds:schemaRef ds:uri="http://schemas.microsoft.com/sharepoint/v3/contenttype/forms"/>
+  </ds:schemaRefs>
+</ds:datastoreItem>
 </file>
 
-<file path=customXml/itemProps1.xml><?xml version="1.0" encoding="utf-8"?>
+<file path=customXml/itemProps3.xml><?xml version="1.0" encoding="utf-8"?>
 <ds:datastoreItem xmlns:ds="http://schemas.openxmlformats.org/officeDocument/2006/customXml" ds:itemID="{992A692A-25B6-46BC-96C7-9EDDDC887137}">
   <ds:schemaRefs>
     <ds:schemaRef ds:uri="http://schemas.microsoft.com/office/2006/metadata/contentType"/>
@@ -18710,28 +18758,4 @@
     <ds:schemaRef ds:uri="http://schemas.microsoft.com/internal/obd"/>
   </ds:schemaRefs>
 </ds:datastoreItem>
-</file>
-
-<file path=customXml/itemProps2.xml><?xml version="1.0" encoding="utf-8"?>
-<ds:datastoreItem xmlns:ds="http://schemas.openxmlformats.org/officeDocument/2006/customXml" ds:itemID="{A7B02A9D-9434-4C86-80C1-9F3F215070DB}">
-  <ds:schemaRefs>
-    <ds:schemaRef ds:uri="http://schemas.microsoft.com/sharepoint/v3/contenttype/forms"/>
-  </ds:schemaRefs>
-</ds:datastoreItem>
-</file>
-
-<file path=customXml/itemProps3.xml><?xml version="1.0" encoding="utf-8"?>
-<ds:datastoreItem xmlns:ds="http://schemas.openxmlformats.org/officeDocument/2006/customXml" ds:itemID="{1090C72B-3F12-47E7-B8FF-10DAB1B14D76}">
-  <ds:schemaRefs>
-    <ds:schemaRef ds:uri="http://purl.org/dc/terms/"/>
-    <ds:schemaRef ds:uri="http://www.w3.org/XML/1998/namespace"/>
-    <ds:schemaRef ds:uri="http://purl.org/dc/dcmitype/"/>
-    <ds:schemaRef ds:uri="978c12c1-a4b5-48eb-9710-7e2c09831ca5"/>
-    <ds:schemaRef ds:uri="http://schemas.microsoft.com/office/2006/documentManagement/types"/>
-    <ds:schemaRef ds:uri="http://schemas.openxmlformats.org/package/2006/metadata/core-properties"/>
-    <ds:schemaRef ds:uri="http://schemas.microsoft.com/office/infopath/2007/PartnerControls"/>
-    <ds:schemaRef ds:uri="http://schemas.microsoft.com/office/2006/metadata/properties"/>
-    <ds:schemaRef ds:uri="http://purl.org/dc/elements/1.1/"/>
-  </ds:schemaRefs>
-</ds:datastoreItem>
 </file>
</xml_diff>